<commit_message>
adds bepug ppt's for setmner meetup
</commit_message>
<xml_diff>
--- a/20180927/_bepug/meetup27092018-intro.pptx
+++ b/20180927/_bepug/meetup27092018-intro.pptx
@@ -2598,7 +2598,7 @@
             <p:ph idx="1"/>
             <p:extLst>
               <p:ext uri="{D42A27DB-BD31-4B8C-83A1-F6EECF244321}">
-                <p14:modId xmlns:p14="http://schemas.microsoft.com/office/powerpoint/2010/main" val="3956824896"/>
+                <p14:modId xmlns:p14="http://schemas.microsoft.com/office/powerpoint/2010/main" val="1117539981"/>
               </p:ext>
             </p:extLst>
           </p:nvPr>
@@ -2705,7 +2705,7 @@
                           <a:latin typeface="Segoe UI Light" panose="020B0502040204020203" pitchFamily="34" charset="0"/>
                           <a:cs typeface="Segoe UI Light" panose="020B0502040204020203" pitchFamily="34" charset="0"/>
                         </a:rPr>
-                        <a:t>…. – 18.30</a:t>
+                        <a:t>….     – 18.30</a:t>
                       </a:r>
                       <a:endParaRPr lang="en-US" sz="2800" b="1" dirty="0">
                         <a:solidFill>
@@ -3172,7 +3172,7 @@
             <p:ph idx="1"/>
             <p:extLst>
               <p:ext uri="{D42A27DB-BD31-4B8C-83A1-F6EECF244321}">
-                <p14:modId xmlns:p14="http://schemas.microsoft.com/office/powerpoint/2010/main" val="1492937253"/>
+                <p14:modId xmlns:p14="http://schemas.microsoft.com/office/powerpoint/2010/main" val="3276912914"/>
               </p:ext>
             </p:extLst>
           </p:nvPr>
@@ -3349,13 +3349,16 @@
                     <a:bodyPr/>
                     <a:lstStyle/>
                     <a:p>
-                      <a:endParaRPr lang="en-US" sz="2800" b="1" dirty="0">
-                        <a:solidFill>
-                          <a:schemeClr val="bg1"/>
-                        </a:solidFill>
-                        <a:latin typeface="Segoe UI Light" panose="020B0502040204020203" pitchFamily="34" charset="0"/>
-                        <a:cs typeface="Segoe UI Light" panose="020B0502040204020203" pitchFamily="34" charset="0"/>
-                      </a:endParaRPr>
+                      <a:r>
+                        <a:rPr lang="en-US" sz="2800" b="1" dirty="0">
+                          <a:solidFill>
+                            <a:schemeClr val="bg1"/>
+                          </a:solidFill>
+                          <a:latin typeface="Segoe UI Light" panose="020B0502040204020203" pitchFamily="34" charset="0"/>
+                          <a:cs typeface="Segoe UI Light" panose="020B0502040204020203" pitchFamily="34" charset="0"/>
+                        </a:rPr>
+                        <a:t>20.15 – 20.30</a:t>
+                      </a:r>
                     </a:p>
                   </a:txBody>
                   <a:tcPr/>
@@ -3410,13 +3413,16 @@
                     <a:bodyPr/>
                     <a:lstStyle/>
                     <a:p>
-                      <a:endParaRPr lang="en-US" sz="2800" b="1" dirty="0">
-                        <a:solidFill>
-                          <a:schemeClr val="bg1"/>
-                        </a:solidFill>
-                        <a:latin typeface="Segoe UI Light" panose="020B0502040204020203" pitchFamily="34" charset="0"/>
-                        <a:cs typeface="Segoe UI Light" panose="020B0502040204020203" pitchFamily="34" charset="0"/>
-                      </a:endParaRPr>
+                      <a:r>
+                        <a:rPr lang="en-US" sz="2800" b="1" dirty="0">
+                          <a:solidFill>
+                            <a:schemeClr val="bg1"/>
+                          </a:solidFill>
+                          <a:latin typeface="Segoe UI Light" panose="020B0502040204020203" pitchFamily="34" charset="0"/>
+                          <a:cs typeface="Segoe UI Light" panose="020B0502040204020203" pitchFamily="34" charset="0"/>
+                        </a:rPr>
+                        <a:t>20.30 – 21.00</a:t>
+                      </a:r>
                     </a:p>
                   </a:txBody>
                   <a:tcPr/>
@@ -3479,7 +3485,27 @@
                           <a:latin typeface="Segoe UI Light" panose="020B0502040204020203" pitchFamily="34" charset="0"/>
                           <a:cs typeface="Segoe UI Light" panose="020B0502040204020203" pitchFamily="34" charset="0"/>
                         </a:rPr>
-                        <a:t>20.15 - …</a:t>
+                        <a:t>21.00 </a:t>
+                      </a:r>
+                      <a:r>
+                        <a:rPr lang="en-US" sz="2800" b="1" dirty="0">
+                          <a:solidFill>
+                            <a:schemeClr val="bg1"/>
+                          </a:solidFill>
+                          <a:latin typeface="Segoe UI Light" panose="020B0502040204020203" pitchFamily="34" charset="0"/>
+                          <a:cs typeface="Segoe UI Light" panose="020B0502040204020203" pitchFamily="34" charset="0"/>
+                        </a:rPr>
+                        <a:t>–</a:t>
+                      </a:r>
+                      <a:r>
+                        <a:rPr lang="fr-BE" sz="2800" b="1" dirty="0">
+                          <a:solidFill>
+                            <a:schemeClr val="bg1"/>
+                          </a:solidFill>
+                          <a:latin typeface="Segoe UI Light" panose="020B0502040204020203" pitchFamily="34" charset="0"/>
+                          <a:cs typeface="Segoe UI Light" panose="020B0502040204020203" pitchFamily="34" charset="0"/>
+                        </a:rPr>
+                        <a:t> ….</a:t>
                       </a:r>
                       <a:endParaRPr lang="en-US" sz="2800" b="1" dirty="0">
                         <a:solidFill>

</xml_diff>